<commit_message>
feat: Update configuration and prompts for improved language handling and JSON validation
</commit_message>
<xml_diff>
--- a/Designs/Design-5.pptx
+++ b/Designs/Design-5.pptx
@@ -101,6 +101,11 @@
       </a:defRPr>
     </a:lvl9pPr>
   </p:defaultTextStyle>
+  <p:extLst>
+    <p:ext uri="{EFAFB233-063F-42B5-8137-9DF3F51BA10A}">
+      <p15:sldGuideLst xmlns:p15="http://schemas.microsoft.com/office/powerpoint/2012/main"/>
+    </p:ext>
+  </p:extLst>
 </p:presentation>
 </file>
 
@@ -243,7 +248,7 @@
           <a:p>
             <a:fld id="{48A87A34-81AB-432B-8DAE-1953F412C126}" type="datetimeFigureOut">
               <a:rPr lang="en-US" dirty="0"/>
-              <a:t>3/7/2023</a:t>
+              <a:t>9/30/2025</a:t>
             </a:fld>
             <a:endParaRPr lang="en-US" dirty="0"/>
           </a:p>
@@ -295,7 +300,7 @@
           <a:p>
             <a:fld id="{6D22F896-40B5-4ADD-8801-0D06FADFA095}" type="slidenum">
               <a:rPr lang="en-US" dirty="0"/>
-              <a:t>‹Nr.›</a:t>
+              <a:t>‹#›</a:t>
             </a:fld>
             <a:endParaRPr lang="en-US" dirty="0"/>
           </a:p>
@@ -311,412 +316,6 @@
           <a:xfrm>
             <a:off x="2417780" y="3528542"/>
             <a:ext cx="8637072" cy="0"/>
-          </a:xfrm>
-          <a:prstGeom prst="line">
-            <a:avLst/>
-          </a:prstGeom>
-          <a:ln w="31750"/>
-        </p:spPr>
-        <p:style>
-          <a:lnRef idx="3">
-            <a:schemeClr val="accent1"/>
-          </a:lnRef>
-          <a:fillRef idx="0">
-            <a:schemeClr val="accent1"/>
-          </a:fillRef>
-          <a:effectRef idx="2">
-            <a:schemeClr val="accent1"/>
-          </a:effectRef>
-          <a:fontRef idx="minor">
-            <a:schemeClr val="tx1"/>
-          </a:fontRef>
-        </p:style>
-      </p:cxnSp>
-    </p:spTree>
-  </p:cSld>
-  <p:clrMapOvr>
-    <a:masterClrMapping/>
-  </p:clrMapOvr>
-</p:sldLayout>
-</file>
-
-<file path=ppt/slideLayouts/slideLayout10.xml><?xml version="1.0" encoding="utf-8"?>
-<p:sldLayout xmlns:a="http://schemas.openxmlformats.org/drawingml/2006/main" xmlns:r="http://schemas.openxmlformats.org/officeDocument/2006/relationships" xmlns:p="http://schemas.openxmlformats.org/presentationml/2006/main" type="vertTx" preserve="1">
-  <p:cSld name="Titel und vertikaler Text">
-    <p:spTree>
-      <p:nvGrpSpPr>
-        <p:cNvPr id="1" name=""/>
-        <p:cNvGrpSpPr/>
-        <p:nvPr/>
-      </p:nvGrpSpPr>
-      <p:grpSpPr>
-        <a:xfrm>
-          <a:off x="0" y="0"/>
-          <a:ext cx="0" cy="0"/>
-          <a:chOff x="0" y="0"/>
-          <a:chExt cx="0" cy="0"/>
-        </a:xfrm>
-      </p:grpSpPr>
-      <p:sp>
-        <p:nvSpPr>
-          <p:cNvPr id="2" name="Title 1"/>
-          <p:cNvSpPr>
-            <a:spLocks noGrp="1"/>
-          </p:cNvSpPr>
-          <p:nvPr>
-            <p:ph type="title"/>
-          </p:nvPr>
-        </p:nvSpPr>
-        <p:spPr/>
-        <p:txBody>
-          <a:bodyPr/>
-          <a:lstStyle/>
-          <a:p>
-            <a:r>
-              <a:rPr lang="de-DE"/>
-              <a:t>Mastertitelformat bearbeiten</a:t>
-            </a:r>
-            <a:endParaRPr lang="en-US" dirty="0"/>
-          </a:p>
-        </p:txBody>
-      </p:sp>
-      <p:sp>
-        <p:nvSpPr>
-          <p:cNvPr id="3" name="Vertical Text Placeholder 2"/>
-          <p:cNvSpPr>
-            <a:spLocks noGrp="1"/>
-          </p:cNvSpPr>
-          <p:nvPr>
-            <p:ph type="body" orient="vert" idx="1"/>
-          </p:nvPr>
-        </p:nvSpPr>
-        <p:spPr/>
-        <p:txBody>
-          <a:bodyPr vert="eaVert"/>
-          <a:lstStyle/>
-          <a:p>
-            <a:pPr lvl="0"/>
-            <a:r>
-              <a:rPr lang="de-DE"/>
-              <a:t>Mastertextformat bearbeiten</a:t>
-            </a:r>
-          </a:p>
-          <a:p>
-            <a:pPr lvl="1"/>
-            <a:r>
-              <a:rPr lang="de-DE"/>
-              <a:t>Zweite Ebene</a:t>
-            </a:r>
-          </a:p>
-          <a:p>
-            <a:pPr lvl="2"/>
-            <a:r>
-              <a:rPr lang="de-DE"/>
-              <a:t>Dritte Ebene</a:t>
-            </a:r>
-          </a:p>
-          <a:p>
-            <a:pPr lvl="3"/>
-            <a:r>
-              <a:rPr lang="de-DE"/>
-              <a:t>Vierte Ebene</a:t>
-            </a:r>
-          </a:p>
-          <a:p>
-            <a:pPr lvl="4"/>
-            <a:r>
-              <a:rPr lang="de-DE"/>
-              <a:t>Fünfte Ebene</a:t>
-            </a:r>
-            <a:endParaRPr lang="en-US" dirty="0"/>
-          </a:p>
-        </p:txBody>
-      </p:sp>
-      <p:sp>
-        <p:nvSpPr>
-          <p:cNvPr id="4" name="Date Placeholder 3"/>
-          <p:cNvSpPr>
-            <a:spLocks noGrp="1"/>
-          </p:cNvSpPr>
-          <p:nvPr>
-            <p:ph type="dt" sz="half" idx="10"/>
-          </p:nvPr>
-        </p:nvSpPr>
-        <p:spPr/>
-        <p:txBody>
-          <a:bodyPr/>
-          <a:lstStyle/>
-          <a:p>
-            <a:fld id="{48A87A34-81AB-432B-8DAE-1953F412C126}" type="datetimeFigureOut">
-              <a:rPr lang="en-US" dirty="0"/>
-              <a:t>3/7/2023</a:t>
-            </a:fld>
-            <a:endParaRPr lang="en-US" dirty="0"/>
-          </a:p>
-        </p:txBody>
-      </p:sp>
-      <p:sp>
-        <p:nvSpPr>
-          <p:cNvPr id="5" name="Footer Placeholder 4"/>
-          <p:cNvSpPr>
-            <a:spLocks noGrp="1"/>
-          </p:cNvSpPr>
-          <p:nvPr>
-            <p:ph type="ftr" sz="quarter" idx="11"/>
-          </p:nvPr>
-        </p:nvSpPr>
-        <p:spPr/>
-        <p:txBody>
-          <a:bodyPr/>
-          <a:lstStyle/>
-          <a:p>
-            <a:endParaRPr lang="en-US" dirty="0"/>
-          </a:p>
-        </p:txBody>
-      </p:sp>
-      <p:sp>
-        <p:nvSpPr>
-          <p:cNvPr id="6" name="Slide Number Placeholder 5"/>
-          <p:cNvSpPr>
-            <a:spLocks noGrp="1"/>
-          </p:cNvSpPr>
-          <p:nvPr>
-            <p:ph type="sldNum" sz="quarter" idx="12"/>
-          </p:nvPr>
-        </p:nvSpPr>
-        <p:spPr/>
-        <p:txBody>
-          <a:bodyPr/>
-          <a:lstStyle/>
-          <a:p>
-            <a:fld id="{6D22F896-40B5-4ADD-8801-0D06FADFA095}" type="slidenum">
-              <a:rPr lang="en-US" dirty="0"/>
-              <a:t>‹Nr.›</a:t>
-            </a:fld>
-            <a:endParaRPr lang="en-US" dirty="0"/>
-          </a:p>
-        </p:txBody>
-      </p:sp>
-      <p:cxnSp>
-        <p:nvCxnSpPr>
-          <p:cNvPr id="26" name="Straight Connector 25"/>
-          <p:cNvCxnSpPr/>
-          <p:nvPr/>
-        </p:nvCxnSpPr>
-        <p:spPr>
-          <a:xfrm>
-            <a:off x="1453896" y="1847088"/>
-            <a:ext cx="9607522" cy="0"/>
-          </a:xfrm>
-          <a:prstGeom prst="line">
-            <a:avLst/>
-          </a:prstGeom>
-          <a:ln w="31750"/>
-        </p:spPr>
-        <p:style>
-          <a:lnRef idx="3">
-            <a:schemeClr val="accent1"/>
-          </a:lnRef>
-          <a:fillRef idx="0">
-            <a:schemeClr val="accent1"/>
-          </a:fillRef>
-          <a:effectRef idx="2">
-            <a:schemeClr val="accent1"/>
-          </a:effectRef>
-          <a:fontRef idx="minor">
-            <a:schemeClr val="tx1"/>
-          </a:fontRef>
-        </p:style>
-      </p:cxnSp>
-    </p:spTree>
-  </p:cSld>
-  <p:clrMapOvr>
-    <a:masterClrMapping/>
-  </p:clrMapOvr>
-</p:sldLayout>
-</file>
-
-<file path=ppt/slideLayouts/slideLayout11.xml><?xml version="1.0" encoding="utf-8"?>
-<p:sldLayout xmlns:a="http://schemas.openxmlformats.org/drawingml/2006/main" xmlns:r="http://schemas.openxmlformats.org/officeDocument/2006/relationships" xmlns:p="http://schemas.openxmlformats.org/presentationml/2006/main" type="vertTitleAndTx" preserve="1">
-  <p:cSld name="Vertikaler Titel und Text">
-    <p:spTree>
-      <p:nvGrpSpPr>
-        <p:cNvPr id="1" name=""/>
-        <p:cNvGrpSpPr/>
-        <p:nvPr/>
-      </p:nvGrpSpPr>
-      <p:grpSpPr>
-        <a:xfrm>
-          <a:off x="0" y="0"/>
-          <a:ext cx="0" cy="0"/>
-          <a:chOff x="0" y="0"/>
-          <a:chExt cx="0" cy="0"/>
-        </a:xfrm>
-      </p:grpSpPr>
-      <p:sp>
-        <p:nvSpPr>
-          <p:cNvPr id="2" name="Vertical Title 1"/>
-          <p:cNvSpPr>
-            <a:spLocks noGrp="1"/>
-          </p:cNvSpPr>
-          <p:nvPr>
-            <p:ph type="title" orient="vert"/>
-          </p:nvPr>
-        </p:nvSpPr>
-        <p:spPr>
-          <a:xfrm>
-            <a:off x="9439111" y="798973"/>
-            <a:ext cx="1615742" cy="4659889"/>
-          </a:xfrm>
-        </p:spPr>
-        <p:txBody>
-          <a:bodyPr vert="eaVert"/>
-          <a:lstStyle>
-            <a:lvl1pPr algn="l">
-              <a:defRPr/>
-            </a:lvl1pPr>
-          </a:lstStyle>
-          <a:p>
-            <a:r>
-              <a:rPr lang="de-DE"/>
-              <a:t>Mastertitelformat bearbeiten</a:t>
-            </a:r>
-            <a:endParaRPr lang="en-US" dirty="0"/>
-          </a:p>
-        </p:txBody>
-      </p:sp>
-      <p:sp>
-        <p:nvSpPr>
-          <p:cNvPr id="3" name="Vertical Text Placeholder 2"/>
-          <p:cNvSpPr>
-            <a:spLocks noGrp="1"/>
-          </p:cNvSpPr>
-          <p:nvPr>
-            <p:ph type="body" orient="vert" idx="1"/>
-          </p:nvPr>
-        </p:nvSpPr>
-        <p:spPr>
-          <a:xfrm>
-            <a:off x="1444672" y="798973"/>
-            <a:ext cx="7828830" cy="4659889"/>
-          </a:xfrm>
-        </p:spPr>
-        <p:txBody>
-          <a:bodyPr vert="eaVert"/>
-          <a:lstStyle/>
-          <a:p>
-            <a:pPr lvl="0"/>
-            <a:r>
-              <a:rPr lang="de-DE"/>
-              <a:t>Mastertextformat bearbeiten</a:t>
-            </a:r>
-          </a:p>
-          <a:p>
-            <a:pPr lvl="1"/>
-            <a:r>
-              <a:rPr lang="de-DE"/>
-              <a:t>Zweite Ebene</a:t>
-            </a:r>
-          </a:p>
-          <a:p>
-            <a:pPr lvl="2"/>
-            <a:r>
-              <a:rPr lang="de-DE"/>
-              <a:t>Dritte Ebene</a:t>
-            </a:r>
-          </a:p>
-          <a:p>
-            <a:pPr lvl="3"/>
-            <a:r>
-              <a:rPr lang="de-DE"/>
-              <a:t>Vierte Ebene</a:t>
-            </a:r>
-          </a:p>
-          <a:p>
-            <a:pPr lvl="4"/>
-            <a:r>
-              <a:rPr lang="de-DE"/>
-              <a:t>Fünfte Ebene</a:t>
-            </a:r>
-            <a:endParaRPr lang="en-US" dirty="0"/>
-          </a:p>
-        </p:txBody>
-      </p:sp>
-      <p:sp>
-        <p:nvSpPr>
-          <p:cNvPr id="4" name="Date Placeholder 3"/>
-          <p:cNvSpPr>
-            <a:spLocks noGrp="1"/>
-          </p:cNvSpPr>
-          <p:nvPr>
-            <p:ph type="dt" sz="half" idx="10"/>
-          </p:nvPr>
-        </p:nvSpPr>
-        <p:spPr/>
-        <p:txBody>
-          <a:bodyPr/>
-          <a:lstStyle/>
-          <a:p>
-            <a:fld id="{48A87A34-81AB-432B-8DAE-1953F412C126}" type="datetimeFigureOut">
-              <a:rPr lang="en-US" dirty="0"/>
-              <a:t>3/7/2023</a:t>
-            </a:fld>
-            <a:endParaRPr lang="en-US" dirty="0"/>
-          </a:p>
-        </p:txBody>
-      </p:sp>
-      <p:sp>
-        <p:nvSpPr>
-          <p:cNvPr id="5" name="Footer Placeholder 4"/>
-          <p:cNvSpPr>
-            <a:spLocks noGrp="1"/>
-          </p:cNvSpPr>
-          <p:nvPr>
-            <p:ph type="ftr" sz="quarter" idx="11"/>
-          </p:nvPr>
-        </p:nvSpPr>
-        <p:spPr/>
-        <p:txBody>
-          <a:bodyPr/>
-          <a:lstStyle/>
-          <a:p>
-            <a:endParaRPr lang="en-US" dirty="0"/>
-          </a:p>
-        </p:txBody>
-      </p:sp>
-      <p:sp>
-        <p:nvSpPr>
-          <p:cNvPr id="6" name="Slide Number Placeholder 5"/>
-          <p:cNvSpPr>
-            <a:spLocks noGrp="1"/>
-          </p:cNvSpPr>
-          <p:nvPr>
-            <p:ph type="sldNum" sz="quarter" idx="12"/>
-          </p:nvPr>
-        </p:nvSpPr>
-        <p:spPr/>
-        <p:txBody>
-          <a:bodyPr/>
-          <a:lstStyle/>
-          <a:p>
-            <a:fld id="{6D22F896-40B5-4ADD-8801-0D06FADFA095}" type="slidenum">
-              <a:rPr lang="en-US" dirty="0"/>
-              <a:t>‹Nr.›</a:t>
-            </a:fld>
-            <a:endParaRPr lang="en-US" dirty="0"/>
-          </a:p>
-        </p:txBody>
-      </p:sp>
-      <p:cxnSp>
-        <p:nvCxnSpPr>
-          <p:cNvPr id="15" name="Straight Connector 14"/>
-          <p:cNvCxnSpPr/>
-          <p:nvPr/>
-        </p:nvCxnSpPr>
-        <p:spPr>
-          <a:xfrm>
-            <a:off x="9439111" y="798973"/>
-            <a:ext cx="0" cy="4659889"/>
           </a:xfrm>
           <a:prstGeom prst="line">
             <a:avLst/>
@@ -855,7 +454,7 @@
           <a:p>
             <a:fld id="{48A87A34-81AB-432B-8DAE-1953F412C126}" type="datetimeFigureOut">
               <a:rPr lang="en-US" dirty="0"/>
-              <a:t>3/7/2023</a:t>
+              <a:t>9/30/2025</a:t>
             </a:fld>
             <a:endParaRPr lang="en-US" dirty="0"/>
           </a:p>
@@ -897,7 +496,7 @@
           <a:p>
             <a:fld id="{6D22F896-40B5-4ADD-8801-0D06FADFA095}" type="slidenum">
               <a:rPr lang="en-US" dirty="0"/>
-              <a:t>‹Nr.›</a:t>
+              <a:t>‹#›</a:t>
             </a:fld>
             <a:endParaRPr lang="en-US" dirty="0"/>
           </a:p>
@@ -1129,7 +728,7 @@
           <a:p>
             <a:fld id="{48A87A34-81AB-432B-8DAE-1953F412C126}" type="datetimeFigureOut">
               <a:rPr lang="en-US" dirty="0"/>
-              <a:t>3/7/2023</a:t>
+              <a:t>9/30/2025</a:t>
             </a:fld>
             <a:endParaRPr lang="en-US" dirty="0"/>
           </a:p>
@@ -1171,7 +770,7 @@
           <a:p>
             <a:fld id="{6D22F896-40B5-4ADD-8801-0D06FADFA095}" type="slidenum">
               <a:rPr lang="en-US" dirty="0"/>
-              <a:t>‹Nr.›</a:t>
+              <a:t>‹#›</a:t>
             </a:fld>
             <a:endParaRPr lang="en-US" dirty="0"/>
           </a:p>
@@ -1217,680 +816,6 @@
 </file>
 
 <file path=ppt/slideLayouts/slideLayout4.xml><?xml version="1.0" encoding="utf-8"?>
-<p:sldLayout xmlns:a="http://schemas.openxmlformats.org/drawingml/2006/main" xmlns:r="http://schemas.openxmlformats.org/officeDocument/2006/relationships" xmlns:p="http://schemas.openxmlformats.org/presentationml/2006/main" type="twoObj" preserve="1">
-  <p:cSld name="Zwei Inhalte">
-    <p:spTree>
-      <p:nvGrpSpPr>
-        <p:cNvPr id="1" name=""/>
-        <p:cNvGrpSpPr/>
-        <p:nvPr/>
-      </p:nvGrpSpPr>
-      <p:grpSpPr>
-        <a:xfrm>
-          <a:off x="0" y="0"/>
-          <a:ext cx="0" cy="0"/>
-          <a:chOff x="0" y="0"/>
-          <a:chExt cx="0" cy="0"/>
-        </a:xfrm>
-      </p:grpSpPr>
-      <p:sp>
-        <p:nvSpPr>
-          <p:cNvPr id="2" name="Title 1"/>
-          <p:cNvSpPr>
-            <a:spLocks noGrp="1"/>
-          </p:cNvSpPr>
-          <p:nvPr>
-            <p:ph type="title"/>
-          </p:nvPr>
-        </p:nvSpPr>
-        <p:spPr>
-          <a:xfrm>
-            <a:off x="1449217" y="804889"/>
-            <a:ext cx="9605635" cy="1059305"/>
-          </a:xfrm>
-        </p:spPr>
-        <p:txBody>
-          <a:bodyPr/>
-          <a:lstStyle/>
-          <a:p>
-            <a:r>
-              <a:rPr lang="de-DE"/>
-              <a:t>Mastertitelformat bearbeiten</a:t>
-            </a:r>
-            <a:endParaRPr lang="en-US" dirty="0"/>
-          </a:p>
-        </p:txBody>
-      </p:sp>
-      <p:sp>
-        <p:nvSpPr>
-          <p:cNvPr id="3" name="Content Placeholder 2"/>
-          <p:cNvSpPr>
-            <a:spLocks noGrp="1"/>
-          </p:cNvSpPr>
-          <p:nvPr>
-            <p:ph sz="half" idx="1"/>
-          </p:nvPr>
-        </p:nvSpPr>
-        <p:spPr>
-          <a:xfrm>
-            <a:off x="1447331" y="2010878"/>
-            <a:ext cx="4645152" cy="3448595"/>
-          </a:xfrm>
-        </p:spPr>
-        <p:txBody>
-          <a:bodyPr/>
-          <a:lstStyle/>
-          <a:p>
-            <a:pPr lvl="0"/>
-            <a:r>
-              <a:rPr lang="de-DE"/>
-              <a:t>Mastertextformat bearbeiten</a:t>
-            </a:r>
-          </a:p>
-          <a:p>
-            <a:pPr lvl="1"/>
-            <a:r>
-              <a:rPr lang="de-DE"/>
-              <a:t>Zweite Ebene</a:t>
-            </a:r>
-          </a:p>
-          <a:p>
-            <a:pPr lvl="2"/>
-            <a:r>
-              <a:rPr lang="de-DE"/>
-              <a:t>Dritte Ebene</a:t>
-            </a:r>
-          </a:p>
-          <a:p>
-            <a:pPr lvl="3"/>
-            <a:r>
-              <a:rPr lang="de-DE"/>
-              <a:t>Vierte Ebene</a:t>
-            </a:r>
-          </a:p>
-          <a:p>
-            <a:pPr lvl="4"/>
-            <a:r>
-              <a:rPr lang="de-DE"/>
-              <a:t>Fünfte Ebene</a:t>
-            </a:r>
-            <a:endParaRPr lang="en-US" dirty="0"/>
-          </a:p>
-        </p:txBody>
-      </p:sp>
-      <p:sp>
-        <p:nvSpPr>
-          <p:cNvPr id="4" name="Content Placeholder 3"/>
-          <p:cNvSpPr>
-            <a:spLocks noGrp="1"/>
-          </p:cNvSpPr>
-          <p:nvPr>
-            <p:ph sz="half" idx="2"/>
-          </p:nvPr>
-        </p:nvSpPr>
-        <p:spPr>
-          <a:xfrm>
-            <a:off x="6413771" y="2017343"/>
-            <a:ext cx="4645152" cy="3441520"/>
-          </a:xfrm>
-        </p:spPr>
-        <p:txBody>
-          <a:bodyPr/>
-          <a:lstStyle/>
-          <a:p>
-            <a:pPr lvl="0"/>
-            <a:r>
-              <a:rPr lang="de-DE"/>
-              <a:t>Mastertextformat bearbeiten</a:t>
-            </a:r>
-          </a:p>
-          <a:p>
-            <a:pPr lvl="1"/>
-            <a:r>
-              <a:rPr lang="de-DE"/>
-              <a:t>Zweite Ebene</a:t>
-            </a:r>
-          </a:p>
-          <a:p>
-            <a:pPr lvl="2"/>
-            <a:r>
-              <a:rPr lang="de-DE"/>
-              <a:t>Dritte Ebene</a:t>
-            </a:r>
-          </a:p>
-          <a:p>
-            <a:pPr lvl="3"/>
-            <a:r>
-              <a:rPr lang="de-DE"/>
-              <a:t>Vierte Ebene</a:t>
-            </a:r>
-          </a:p>
-          <a:p>
-            <a:pPr lvl="4"/>
-            <a:r>
-              <a:rPr lang="de-DE"/>
-              <a:t>Fünfte Ebene</a:t>
-            </a:r>
-            <a:endParaRPr lang="en-US" dirty="0"/>
-          </a:p>
-        </p:txBody>
-      </p:sp>
-      <p:sp>
-        <p:nvSpPr>
-          <p:cNvPr id="5" name="Date Placeholder 4"/>
-          <p:cNvSpPr>
-            <a:spLocks noGrp="1"/>
-          </p:cNvSpPr>
-          <p:nvPr>
-            <p:ph type="dt" sz="half" idx="10"/>
-          </p:nvPr>
-        </p:nvSpPr>
-        <p:spPr/>
-        <p:txBody>
-          <a:bodyPr/>
-          <a:lstStyle/>
-          <a:p>
-            <a:fld id="{48A87A34-81AB-432B-8DAE-1953F412C126}" type="datetimeFigureOut">
-              <a:rPr lang="en-US" dirty="0"/>
-              <a:t>3/7/2023</a:t>
-            </a:fld>
-            <a:endParaRPr lang="en-US" dirty="0"/>
-          </a:p>
-        </p:txBody>
-      </p:sp>
-      <p:sp>
-        <p:nvSpPr>
-          <p:cNvPr id="6" name="Footer Placeholder 5"/>
-          <p:cNvSpPr>
-            <a:spLocks noGrp="1"/>
-          </p:cNvSpPr>
-          <p:nvPr>
-            <p:ph type="ftr" sz="quarter" idx="11"/>
-          </p:nvPr>
-        </p:nvSpPr>
-        <p:spPr/>
-        <p:txBody>
-          <a:bodyPr/>
-          <a:lstStyle/>
-          <a:p>
-            <a:endParaRPr lang="en-US" dirty="0"/>
-          </a:p>
-        </p:txBody>
-      </p:sp>
-      <p:sp>
-        <p:nvSpPr>
-          <p:cNvPr id="7" name="Slide Number Placeholder 6"/>
-          <p:cNvSpPr>
-            <a:spLocks noGrp="1"/>
-          </p:cNvSpPr>
-          <p:nvPr>
-            <p:ph type="sldNum" sz="quarter" idx="12"/>
-          </p:nvPr>
-        </p:nvSpPr>
-        <p:spPr/>
-        <p:txBody>
-          <a:bodyPr/>
-          <a:lstStyle/>
-          <a:p>
-            <a:fld id="{6D22F896-40B5-4ADD-8801-0D06FADFA095}" type="slidenum">
-              <a:rPr lang="en-US" dirty="0"/>
-              <a:t>‹Nr.›</a:t>
-            </a:fld>
-            <a:endParaRPr lang="en-US" dirty="0"/>
-          </a:p>
-        </p:txBody>
-      </p:sp>
-      <p:cxnSp>
-        <p:nvCxnSpPr>
-          <p:cNvPr id="35" name="Straight Connector 34"/>
-          <p:cNvCxnSpPr/>
-          <p:nvPr/>
-        </p:nvCxnSpPr>
-        <p:spPr>
-          <a:xfrm>
-            <a:off x="1453896" y="1847088"/>
-            <a:ext cx="9607522" cy="0"/>
-          </a:xfrm>
-          <a:prstGeom prst="line">
-            <a:avLst/>
-          </a:prstGeom>
-          <a:ln w="31750"/>
-        </p:spPr>
-        <p:style>
-          <a:lnRef idx="3">
-            <a:schemeClr val="accent1"/>
-          </a:lnRef>
-          <a:fillRef idx="0">
-            <a:schemeClr val="accent1"/>
-          </a:fillRef>
-          <a:effectRef idx="2">
-            <a:schemeClr val="accent1"/>
-          </a:effectRef>
-          <a:fontRef idx="minor">
-            <a:schemeClr val="tx1"/>
-          </a:fontRef>
-        </p:style>
-      </p:cxnSp>
-    </p:spTree>
-  </p:cSld>
-  <p:clrMapOvr>
-    <a:masterClrMapping/>
-  </p:clrMapOvr>
-</p:sldLayout>
-</file>
-
-<file path=ppt/slideLayouts/slideLayout5.xml><?xml version="1.0" encoding="utf-8"?>
-<p:sldLayout xmlns:a="http://schemas.openxmlformats.org/drawingml/2006/main" xmlns:r="http://schemas.openxmlformats.org/officeDocument/2006/relationships" xmlns:p="http://schemas.openxmlformats.org/presentationml/2006/main" type="twoTxTwoObj" preserve="1">
-  <p:cSld name="Vergleich">
-    <p:spTree>
-      <p:nvGrpSpPr>
-        <p:cNvPr id="1" name=""/>
-        <p:cNvGrpSpPr/>
-        <p:nvPr/>
-      </p:nvGrpSpPr>
-      <p:grpSpPr>
-        <a:xfrm>
-          <a:off x="0" y="0"/>
-          <a:ext cx="0" cy="0"/>
-          <a:chOff x="0" y="0"/>
-          <a:chExt cx="0" cy="0"/>
-        </a:xfrm>
-      </p:grpSpPr>
-      <p:sp>
-        <p:nvSpPr>
-          <p:cNvPr id="2" name="Title 1"/>
-          <p:cNvSpPr>
-            <a:spLocks noGrp="1"/>
-          </p:cNvSpPr>
-          <p:nvPr>
-            <p:ph type="title"/>
-          </p:nvPr>
-        </p:nvSpPr>
-        <p:spPr>
-          <a:xfrm>
-            <a:off x="1447191" y="804163"/>
-            <a:ext cx="9607661" cy="1056319"/>
-          </a:xfrm>
-        </p:spPr>
-        <p:txBody>
-          <a:bodyPr/>
-          <a:lstStyle/>
-          <a:p>
-            <a:r>
-              <a:rPr lang="de-DE"/>
-              <a:t>Mastertitelformat bearbeiten</a:t>
-            </a:r>
-            <a:endParaRPr lang="en-US" dirty="0"/>
-          </a:p>
-        </p:txBody>
-      </p:sp>
-      <p:sp>
-        <p:nvSpPr>
-          <p:cNvPr id="3" name="Text Placeholder 2"/>
-          <p:cNvSpPr>
-            <a:spLocks noGrp="1"/>
-          </p:cNvSpPr>
-          <p:nvPr>
-            <p:ph type="body" idx="1"/>
-          </p:nvPr>
-        </p:nvSpPr>
-        <p:spPr>
-          <a:xfrm>
-            <a:off x="1447191" y="2019549"/>
-            <a:ext cx="4645152" cy="801943"/>
-          </a:xfrm>
-        </p:spPr>
-        <p:txBody>
-          <a:bodyPr anchor="b">
-            <a:normAutofit/>
-          </a:bodyPr>
-          <a:lstStyle>
-            <a:lvl1pPr marL="0" indent="0">
-              <a:lnSpc>
-                <a:spcPct val="100000"/>
-              </a:lnSpc>
-              <a:buNone/>
-              <a:defRPr sz="2200" b="0" cap="all" baseline="0">
-                <a:solidFill>
-                  <a:schemeClr val="accent1"/>
-                </a:solidFill>
-              </a:defRPr>
-            </a:lvl1pPr>
-            <a:lvl2pPr marL="457200" indent="0">
-              <a:buNone/>
-              <a:defRPr sz="2000" b="1"/>
-            </a:lvl2pPr>
-            <a:lvl3pPr marL="914400" indent="0">
-              <a:buNone/>
-              <a:defRPr sz="1800" b="1"/>
-            </a:lvl3pPr>
-            <a:lvl4pPr marL="1371600" indent="0">
-              <a:buNone/>
-              <a:defRPr sz="1600" b="1"/>
-            </a:lvl4pPr>
-            <a:lvl5pPr marL="1828800" indent="0">
-              <a:buNone/>
-              <a:defRPr sz="1600" b="1"/>
-            </a:lvl5pPr>
-            <a:lvl6pPr marL="2286000" indent="0">
-              <a:buNone/>
-              <a:defRPr sz="1600" b="1"/>
-            </a:lvl6pPr>
-            <a:lvl7pPr marL="2743200" indent="0">
-              <a:buNone/>
-              <a:defRPr sz="1600" b="1"/>
-            </a:lvl7pPr>
-            <a:lvl8pPr marL="3200400" indent="0">
-              <a:buNone/>
-              <a:defRPr sz="1600" b="1"/>
-            </a:lvl8pPr>
-            <a:lvl9pPr marL="3657600" indent="0">
-              <a:buNone/>
-              <a:defRPr sz="1600" b="1"/>
-            </a:lvl9pPr>
-          </a:lstStyle>
-          <a:p>
-            <a:pPr lvl="0"/>
-            <a:r>
-              <a:rPr lang="de-DE"/>
-              <a:t>Mastertextformat bearbeiten</a:t>
-            </a:r>
-          </a:p>
-        </p:txBody>
-      </p:sp>
-      <p:sp>
-        <p:nvSpPr>
-          <p:cNvPr id="4" name="Content Placeholder 3"/>
-          <p:cNvSpPr>
-            <a:spLocks noGrp="1"/>
-          </p:cNvSpPr>
-          <p:nvPr>
-            <p:ph sz="half" idx="2"/>
-          </p:nvPr>
-        </p:nvSpPr>
-        <p:spPr>
-          <a:xfrm>
-            <a:off x="1447191" y="2824269"/>
-            <a:ext cx="4645152" cy="2644457"/>
-          </a:xfrm>
-        </p:spPr>
-        <p:txBody>
-          <a:bodyPr/>
-          <a:lstStyle/>
-          <a:p>
-            <a:pPr lvl="0"/>
-            <a:r>
-              <a:rPr lang="de-DE"/>
-              <a:t>Mastertextformat bearbeiten</a:t>
-            </a:r>
-          </a:p>
-          <a:p>
-            <a:pPr lvl="1"/>
-            <a:r>
-              <a:rPr lang="de-DE"/>
-              <a:t>Zweite Ebene</a:t>
-            </a:r>
-          </a:p>
-          <a:p>
-            <a:pPr lvl="2"/>
-            <a:r>
-              <a:rPr lang="de-DE"/>
-              <a:t>Dritte Ebene</a:t>
-            </a:r>
-          </a:p>
-          <a:p>
-            <a:pPr lvl="3"/>
-            <a:r>
-              <a:rPr lang="de-DE"/>
-              <a:t>Vierte Ebene</a:t>
-            </a:r>
-          </a:p>
-          <a:p>
-            <a:pPr lvl="4"/>
-            <a:r>
-              <a:rPr lang="de-DE"/>
-              <a:t>Fünfte Ebene</a:t>
-            </a:r>
-            <a:endParaRPr lang="en-US" dirty="0"/>
-          </a:p>
-        </p:txBody>
-      </p:sp>
-      <p:sp>
-        <p:nvSpPr>
-          <p:cNvPr id="5" name="Text Placeholder 4"/>
-          <p:cNvSpPr>
-            <a:spLocks noGrp="1"/>
-          </p:cNvSpPr>
-          <p:nvPr>
-            <p:ph type="body" sz="quarter" idx="3"/>
-          </p:nvPr>
-        </p:nvSpPr>
-        <p:spPr>
-          <a:xfrm>
-            <a:off x="6412362" y="2023003"/>
-            <a:ext cx="4645152" cy="802237"/>
-          </a:xfrm>
-        </p:spPr>
-        <p:txBody>
-          <a:bodyPr anchor="b">
-            <a:normAutofit/>
-          </a:bodyPr>
-          <a:lstStyle>
-            <a:lvl1pPr marL="0" indent="0">
-              <a:lnSpc>
-                <a:spcPct val="100000"/>
-              </a:lnSpc>
-              <a:buNone/>
-              <a:defRPr sz="2200" b="0" cap="all" baseline="0">
-                <a:solidFill>
-                  <a:schemeClr val="accent1"/>
-                </a:solidFill>
-              </a:defRPr>
-            </a:lvl1pPr>
-            <a:lvl2pPr marL="457200" indent="0">
-              <a:buNone/>
-              <a:defRPr sz="2000" b="1"/>
-            </a:lvl2pPr>
-            <a:lvl3pPr marL="914400" indent="0">
-              <a:buNone/>
-              <a:defRPr sz="1800" b="1"/>
-            </a:lvl3pPr>
-            <a:lvl4pPr marL="1371600" indent="0">
-              <a:buNone/>
-              <a:defRPr sz="1600" b="1"/>
-            </a:lvl4pPr>
-            <a:lvl5pPr marL="1828800" indent="0">
-              <a:buNone/>
-              <a:defRPr sz="1600" b="1"/>
-            </a:lvl5pPr>
-            <a:lvl6pPr marL="2286000" indent="0">
-              <a:buNone/>
-              <a:defRPr sz="1600" b="1"/>
-            </a:lvl6pPr>
-            <a:lvl7pPr marL="2743200" indent="0">
-              <a:buNone/>
-              <a:defRPr sz="1600" b="1"/>
-            </a:lvl7pPr>
-            <a:lvl8pPr marL="3200400" indent="0">
-              <a:buNone/>
-              <a:defRPr sz="1600" b="1"/>
-            </a:lvl8pPr>
-            <a:lvl9pPr marL="3657600" indent="0">
-              <a:buNone/>
-              <a:defRPr sz="1600" b="1"/>
-            </a:lvl9pPr>
-          </a:lstStyle>
-          <a:p>
-            <a:pPr lvl="0"/>
-            <a:r>
-              <a:rPr lang="de-DE"/>
-              <a:t>Mastertextformat bearbeiten</a:t>
-            </a:r>
-          </a:p>
-        </p:txBody>
-      </p:sp>
-      <p:sp>
-        <p:nvSpPr>
-          <p:cNvPr id="6" name="Content Placeholder 5"/>
-          <p:cNvSpPr>
-            <a:spLocks noGrp="1"/>
-          </p:cNvSpPr>
-          <p:nvPr>
-            <p:ph sz="quarter" idx="4"/>
-          </p:nvPr>
-        </p:nvSpPr>
-        <p:spPr>
-          <a:xfrm>
-            <a:off x="6412362" y="2821491"/>
-            <a:ext cx="4645152" cy="2637371"/>
-          </a:xfrm>
-        </p:spPr>
-        <p:txBody>
-          <a:bodyPr/>
-          <a:lstStyle/>
-          <a:p>
-            <a:pPr lvl="0"/>
-            <a:r>
-              <a:rPr lang="de-DE"/>
-              <a:t>Mastertextformat bearbeiten</a:t>
-            </a:r>
-          </a:p>
-          <a:p>
-            <a:pPr lvl="1"/>
-            <a:r>
-              <a:rPr lang="de-DE"/>
-              <a:t>Zweite Ebene</a:t>
-            </a:r>
-          </a:p>
-          <a:p>
-            <a:pPr lvl="2"/>
-            <a:r>
-              <a:rPr lang="de-DE"/>
-              <a:t>Dritte Ebene</a:t>
-            </a:r>
-          </a:p>
-          <a:p>
-            <a:pPr lvl="3"/>
-            <a:r>
-              <a:rPr lang="de-DE"/>
-              <a:t>Vierte Ebene</a:t>
-            </a:r>
-          </a:p>
-          <a:p>
-            <a:pPr lvl="4"/>
-            <a:r>
-              <a:rPr lang="de-DE"/>
-              <a:t>Fünfte Ebene</a:t>
-            </a:r>
-            <a:endParaRPr lang="en-US" dirty="0"/>
-          </a:p>
-        </p:txBody>
-      </p:sp>
-      <p:sp>
-        <p:nvSpPr>
-          <p:cNvPr id="7" name="Date Placeholder 6"/>
-          <p:cNvSpPr>
-            <a:spLocks noGrp="1"/>
-          </p:cNvSpPr>
-          <p:nvPr>
-            <p:ph type="dt" sz="half" idx="10"/>
-          </p:nvPr>
-        </p:nvSpPr>
-        <p:spPr/>
-        <p:txBody>
-          <a:bodyPr/>
-          <a:lstStyle/>
-          <a:p>
-            <a:fld id="{48A87A34-81AB-432B-8DAE-1953F412C126}" type="datetimeFigureOut">
-              <a:rPr lang="en-US" dirty="0"/>
-              <a:t>3/7/2023</a:t>
-            </a:fld>
-            <a:endParaRPr lang="en-US" dirty="0"/>
-          </a:p>
-        </p:txBody>
-      </p:sp>
-      <p:sp>
-        <p:nvSpPr>
-          <p:cNvPr id="8" name="Footer Placeholder 7"/>
-          <p:cNvSpPr>
-            <a:spLocks noGrp="1"/>
-          </p:cNvSpPr>
-          <p:nvPr>
-            <p:ph type="ftr" sz="quarter" idx="11"/>
-          </p:nvPr>
-        </p:nvSpPr>
-        <p:spPr/>
-        <p:txBody>
-          <a:bodyPr/>
-          <a:lstStyle/>
-          <a:p>
-            <a:endParaRPr lang="en-US" dirty="0"/>
-          </a:p>
-        </p:txBody>
-      </p:sp>
-      <p:sp>
-        <p:nvSpPr>
-          <p:cNvPr id="9" name="Slide Number Placeholder 8"/>
-          <p:cNvSpPr>
-            <a:spLocks noGrp="1"/>
-          </p:cNvSpPr>
-          <p:nvPr>
-            <p:ph type="sldNum" sz="quarter" idx="12"/>
-          </p:nvPr>
-        </p:nvSpPr>
-        <p:spPr/>
-        <p:txBody>
-          <a:bodyPr/>
-          <a:lstStyle/>
-          <a:p>
-            <a:fld id="{6D22F896-40B5-4ADD-8801-0D06FADFA095}" type="slidenum">
-              <a:rPr lang="en-US" dirty="0"/>
-              <a:t>‹Nr.›</a:t>
-            </a:fld>
-            <a:endParaRPr lang="en-US" dirty="0"/>
-          </a:p>
-        </p:txBody>
-      </p:sp>
-      <p:cxnSp>
-        <p:nvCxnSpPr>
-          <p:cNvPr id="29" name="Straight Connector 28"/>
-          <p:cNvCxnSpPr/>
-          <p:nvPr/>
-        </p:nvCxnSpPr>
-        <p:spPr>
-          <a:xfrm>
-            <a:off x="1453896" y="1847088"/>
-            <a:ext cx="9607522" cy="0"/>
-          </a:xfrm>
-          <a:prstGeom prst="line">
-            <a:avLst/>
-          </a:prstGeom>
-          <a:ln w="31750"/>
-        </p:spPr>
-        <p:style>
-          <a:lnRef idx="3">
-            <a:schemeClr val="accent1"/>
-          </a:lnRef>
-          <a:fillRef idx="0">
-            <a:schemeClr val="accent1"/>
-          </a:fillRef>
-          <a:effectRef idx="2">
-            <a:schemeClr val="accent1"/>
-          </a:effectRef>
-          <a:fontRef idx="minor">
-            <a:schemeClr val="tx1"/>
-          </a:fontRef>
-        </p:style>
-      </p:cxnSp>
-    </p:spTree>
-  </p:cSld>
-  <p:clrMapOvr>
-    <a:masterClrMapping/>
-  </p:clrMapOvr>
-</p:sldLayout>
-</file>
-
-<file path=ppt/slideLayouts/slideLayout6.xml><?xml version="1.0" encoding="utf-8"?>
 <p:sldLayout xmlns:a="http://schemas.openxmlformats.org/drawingml/2006/main" xmlns:r="http://schemas.openxmlformats.org/officeDocument/2006/relationships" xmlns:p="http://schemas.openxmlformats.org/presentationml/2006/main" type="titleOnly" preserve="1">
   <p:cSld name="Nur Titel">
     <p:spTree>
@@ -1947,7 +872,7 @@
           <a:p>
             <a:fld id="{48A87A34-81AB-432B-8DAE-1953F412C126}" type="datetimeFigureOut">
               <a:rPr lang="en-US" dirty="0"/>
-              <a:t>3/7/2023</a:t>
+              <a:t>9/30/2025</a:t>
             </a:fld>
             <a:endParaRPr lang="en-US" dirty="0"/>
           </a:p>
@@ -1989,7 +914,7 @@
           <a:p>
             <a:fld id="{6D22F896-40B5-4ADD-8801-0D06FADFA095}" type="slidenum">
               <a:rPr lang="en-US" dirty="0"/>
-              <a:t>‹Nr.›</a:t>
+              <a:t>‹#›</a:t>
             </a:fld>
             <a:endParaRPr lang="en-US" dirty="0"/>
           </a:p>
@@ -2034,7 +959,7 @@
 </p:sldLayout>
 </file>
 
-<file path=ppt/slideLayouts/slideLayout7.xml><?xml version="1.0" encoding="utf-8"?>
+<file path=ppt/slideLayouts/slideLayout5.xml><?xml version="1.0" encoding="utf-8"?>
 <p:sldLayout xmlns:a="http://schemas.openxmlformats.org/drawingml/2006/main" xmlns:r="http://schemas.openxmlformats.org/officeDocument/2006/relationships" xmlns:p="http://schemas.openxmlformats.org/presentationml/2006/main" type="blank" preserve="1">
   <p:cSld name="Leer">
     <p:spTree>
@@ -2068,7 +993,7 @@
           <a:p>
             <a:fld id="{48A87A34-81AB-432B-8DAE-1953F412C126}" type="datetimeFigureOut">
               <a:rPr lang="en-US" dirty="0"/>
-              <a:t>3/7/2023</a:t>
+              <a:t>9/30/2025</a:t>
             </a:fld>
             <a:endParaRPr lang="en-US" dirty="0"/>
           </a:p>
@@ -2110,7 +1035,7 @@
           <a:p>
             <a:fld id="{6D22F896-40B5-4ADD-8801-0D06FADFA095}" type="slidenum">
               <a:rPr lang="en-US" dirty="0"/>
-              <a:t>‹Nr.›</a:t>
+              <a:t>‹#›</a:t>
             </a:fld>
             <a:endParaRPr lang="en-US" dirty="0"/>
           </a:p>
@@ -2124,7 +1049,7 @@
 </p:sldLayout>
 </file>
 
-<file path=ppt/slideLayouts/slideLayout8.xml><?xml version="1.0" encoding="utf-8"?>
+<file path=ppt/slideLayouts/slideLayout6.xml><?xml version="1.0" encoding="utf-8"?>
 <p:sldLayout xmlns:a="http://schemas.openxmlformats.org/drawingml/2006/main" xmlns:r="http://schemas.openxmlformats.org/officeDocument/2006/relationships" xmlns:p="http://schemas.openxmlformats.org/presentationml/2006/main" type="objTx" preserve="1">
   <p:cSld name="Inhalt mit Überschrift">
     <p:spTree>
@@ -2314,7 +1239,7 @@
           <a:p>
             <a:fld id="{48A87A34-81AB-432B-8DAE-1953F412C126}" type="datetimeFigureOut">
               <a:rPr lang="en-US" dirty="0"/>
-              <a:t>3/7/2023</a:t>
+              <a:t>9/30/2025</a:t>
             </a:fld>
             <a:endParaRPr lang="en-US" dirty="0"/>
           </a:p>
@@ -2356,7 +1281,7 @@
           <a:p>
             <a:fld id="{6D22F896-40B5-4ADD-8801-0D06FADFA095}" type="slidenum">
               <a:rPr lang="en-US" dirty="0"/>
-              <a:t>‹Nr.›</a:t>
+              <a:t>‹#›</a:t>
             </a:fld>
             <a:endParaRPr lang="en-US" dirty="0"/>
           </a:p>
@@ -2401,9 +1326,9 @@
 </p:sldLayout>
 </file>
 
-<file path=ppt/slideLayouts/slideLayout9.xml><?xml version="1.0" encoding="utf-8"?>
-<p:sldLayout xmlns:a="http://schemas.openxmlformats.org/drawingml/2006/main" xmlns:r="http://schemas.openxmlformats.org/officeDocument/2006/relationships" xmlns:p="http://schemas.openxmlformats.org/presentationml/2006/main" type="picTx" preserve="1">
-  <p:cSld name="Bild mit Überschrift">
+<file path=ppt/slideLayouts/slideLayout7.xml><?xml version="1.0" encoding="utf-8"?>
+<p:sldLayout xmlns:a="http://schemas.openxmlformats.org/drawingml/2006/main" xmlns:r="http://schemas.openxmlformats.org/officeDocument/2006/relationships" xmlns:p="http://schemas.openxmlformats.org/presentationml/2006/main" type="vertTx" preserve="1">
+  <p:cSld name="Titel und vertikaler Text">
     <p:spTree>
       <p:nvGrpSpPr>
         <p:cNvPr id="1" name=""/>
@@ -2418,344 +1343,309 @@
           <a:chExt cx="0" cy="0"/>
         </a:xfrm>
       </p:grpSpPr>
-      <p:grpSp>
-        <p:nvGrpSpPr>
-          <p:cNvPr id="8" name="Group 7"/>
-          <p:cNvGrpSpPr/>
+      <p:sp>
+        <p:nvSpPr>
+          <p:cNvPr id="2" name="Title 1"/>
+          <p:cNvSpPr>
+            <a:spLocks noGrp="1"/>
+          </p:cNvSpPr>
+          <p:nvPr>
+            <p:ph type="title"/>
+          </p:nvPr>
+        </p:nvSpPr>
+        <p:spPr/>
+        <p:txBody>
+          <a:bodyPr/>
+          <a:lstStyle/>
+          <a:p>
+            <a:r>
+              <a:rPr lang="de-DE"/>
+              <a:t>Mastertitelformat bearbeiten</a:t>
+            </a:r>
+            <a:endParaRPr lang="en-US" dirty="0"/>
+          </a:p>
+        </p:txBody>
+      </p:sp>
+      <p:sp>
+        <p:nvSpPr>
+          <p:cNvPr id="3" name="Vertical Text Placeholder 2"/>
+          <p:cNvSpPr>
+            <a:spLocks noGrp="1"/>
+          </p:cNvSpPr>
+          <p:nvPr>
+            <p:ph type="body" orient="vert" idx="1"/>
+          </p:nvPr>
+        </p:nvSpPr>
+        <p:spPr/>
+        <p:txBody>
+          <a:bodyPr vert="eaVert"/>
+          <a:lstStyle/>
+          <a:p>
+            <a:pPr lvl="0"/>
+            <a:r>
+              <a:rPr lang="de-DE"/>
+              <a:t>Mastertextformat bearbeiten</a:t>
+            </a:r>
+          </a:p>
+          <a:p>
+            <a:pPr lvl="1"/>
+            <a:r>
+              <a:rPr lang="de-DE"/>
+              <a:t>Zweite Ebene</a:t>
+            </a:r>
+          </a:p>
+          <a:p>
+            <a:pPr lvl="2"/>
+            <a:r>
+              <a:rPr lang="de-DE"/>
+              <a:t>Dritte Ebene</a:t>
+            </a:r>
+          </a:p>
+          <a:p>
+            <a:pPr lvl="3"/>
+            <a:r>
+              <a:rPr lang="de-DE"/>
+              <a:t>Vierte Ebene</a:t>
+            </a:r>
+          </a:p>
+          <a:p>
+            <a:pPr lvl="4"/>
+            <a:r>
+              <a:rPr lang="de-DE"/>
+              <a:t>Fünfte Ebene</a:t>
+            </a:r>
+            <a:endParaRPr lang="en-US" dirty="0"/>
+          </a:p>
+        </p:txBody>
+      </p:sp>
+      <p:sp>
+        <p:nvSpPr>
+          <p:cNvPr id="4" name="Date Placeholder 3"/>
+          <p:cNvSpPr>
+            <a:spLocks noGrp="1"/>
+          </p:cNvSpPr>
+          <p:nvPr>
+            <p:ph type="dt" sz="half" idx="10"/>
+          </p:nvPr>
+        </p:nvSpPr>
+        <p:spPr/>
+        <p:txBody>
+          <a:bodyPr/>
+          <a:lstStyle/>
+          <a:p>
+            <a:fld id="{48A87A34-81AB-432B-8DAE-1953F412C126}" type="datetimeFigureOut">
+              <a:rPr lang="en-US" dirty="0"/>
+              <a:t>9/30/2025</a:t>
+            </a:fld>
+            <a:endParaRPr lang="en-US" dirty="0"/>
+          </a:p>
+        </p:txBody>
+      </p:sp>
+      <p:sp>
+        <p:nvSpPr>
+          <p:cNvPr id="5" name="Footer Placeholder 4"/>
+          <p:cNvSpPr>
+            <a:spLocks noGrp="1"/>
+          </p:cNvSpPr>
+          <p:nvPr>
+            <p:ph type="ftr" sz="quarter" idx="11"/>
+          </p:nvPr>
+        </p:nvSpPr>
+        <p:spPr/>
+        <p:txBody>
+          <a:bodyPr/>
+          <a:lstStyle/>
+          <a:p>
+            <a:endParaRPr lang="en-US" dirty="0"/>
+          </a:p>
+        </p:txBody>
+      </p:sp>
+      <p:sp>
+        <p:nvSpPr>
+          <p:cNvPr id="6" name="Slide Number Placeholder 5"/>
+          <p:cNvSpPr>
+            <a:spLocks noGrp="1"/>
+          </p:cNvSpPr>
+          <p:nvPr>
+            <p:ph type="sldNum" sz="quarter" idx="12"/>
+          </p:nvPr>
+        </p:nvSpPr>
+        <p:spPr/>
+        <p:txBody>
+          <a:bodyPr/>
+          <a:lstStyle/>
+          <a:p>
+            <a:fld id="{6D22F896-40B5-4ADD-8801-0D06FADFA095}" type="slidenum">
+              <a:rPr lang="en-US" dirty="0"/>
+              <a:t>‹#›</a:t>
+            </a:fld>
+            <a:endParaRPr lang="en-US" dirty="0"/>
+          </a:p>
+        </p:txBody>
+      </p:sp>
+      <p:cxnSp>
+        <p:nvCxnSpPr>
+          <p:cNvPr id="26" name="Straight Connector 25"/>
+          <p:cNvCxnSpPr/>
           <p:nvPr/>
-        </p:nvGrpSpPr>
-        <p:grpSpPr>
-          <a:xfrm>
-            <a:off x="7477387" y="482170"/>
-            <a:ext cx="4074533" cy="5149101"/>
-            <a:chOff x="7477387" y="482170"/>
-            <a:chExt cx="4074533" cy="5149101"/>
-          </a:xfrm>
-        </p:grpSpPr>
-        <p:sp>
-          <p:nvSpPr>
-            <p:cNvPr id="18" name="Rectangle 17"/>
-            <p:cNvSpPr/>
-            <p:nvPr/>
-          </p:nvSpPr>
-          <p:spPr bwMode="black">
-            <a:xfrm>
-              <a:off x="7477387" y="482170"/>
-              <a:ext cx="4074533" cy="5149101"/>
-            </a:xfrm>
-            <a:prstGeom prst="rect">
-              <a:avLst/>
-            </a:prstGeom>
-            <a:gradFill>
-              <a:gsLst>
-                <a:gs pos="0">
-                  <a:srgbClr val="000001"/>
-                </a:gs>
-                <a:gs pos="100000">
-                  <a:srgbClr val="191919"/>
-                </a:gs>
-              </a:gsLst>
-            </a:gradFill>
-            <a:ln w="76200" cmpd="sng">
-              <a:noFill/>
-              <a:miter lim="800000"/>
-            </a:ln>
-            <a:effectLst>
-              <a:outerShdw blurRad="127000" dist="228600" dir="4740000" sx="98000" sy="98000" algn="tl" rotWithShape="0">
-                <a:srgbClr val="000000">
-                  <a:alpha val="34000"/>
-                </a:srgbClr>
-              </a:outerShdw>
-            </a:effectLst>
-            <a:scene3d>
-              <a:camera prst="orthographicFront"/>
-              <a:lightRig rig="threePt" dir="t"/>
-            </a:scene3d>
-            <a:sp3d>
-              <a:bevelT w="152400" h="50800" prst="softRound"/>
-            </a:sp3d>
-          </p:spPr>
-          <p:style>
-            <a:lnRef idx="1">
-              <a:schemeClr val="accent1"/>
-            </a:lnRef>
-            <a:fillRef idx="3">
-              <a:schemeClr val="accent1"/>
-            </a:fillRef>
-            <a:effectRef idx="2">
-              <a:schemeClr val="accent1"/>
-            </a:effectRef>
-            <a:fontRef idx="minor">
-              <a:schemeClr val="lt1"/>
-            </a:fontRef>
-          </p:style>
-        </p:sp>
-        <p:sp>
-          <p:nvSpPr>
-            <p:cNvPr id="19" name="Rectangle 18"/>
-            <p:cNvSpPr/>
-            <p:nvPr/>
-          </p:nvSpPr>
-          <p:spPr bwMode="blackWhite">
-            <a:xfrm>
-              <a:off x="7790446" y="812506"/>
-              <a:ext cx="3450289" cy="4466452"/>
-            </a:xfrm>
-            <a:prstGeom prst="rect">
-              <a:avLst/>
-            </a:prstGeom>
-            <a:gradFill>
-              <a:gsLst>
-                <a:gs pos="0">
-                  <a:srgbClr val="DADADA"/>
-                </a:gs>
-                <a:gs pos="100000">
-                  <a:srgbClr val="FFFFFE"/>
-                </a:gs>
-              </a:gsLst>
-              <a:lin ang="16200000" scaled="0"/>
-            </a:gradFill>
-            <a:ln w="50800" cmpd="sng">
-              <a:solidFill>
-                <a:srgbClr val="191919"/>
-              </a:solidFill>
-              <a:miter lim="800000"/>
-            </a:ln>
-            <a:effectLst>
-              <a:innerShdw blurRad="63500" dist="88900" dir="14100000">
-                <a:srgbClr val="000000">
-                  <a:alpha val="30000"/>
-                </a:srgbClr>
-              </a:innerShdw>
-            </a:effectLst>
-            <a:scene3d>
-              <a:camera prst="orthographicFront"/>
-              <a:lightRig rig="threePt" dir="t"/>
-            </a:scene3d>
-            <a:sp3d>
-              <a:bevelT prst="relaxedInset"/>
-            </a:sp3d>
-          </p:spPr>
-          <p:style>
-            <a:lnRef idx="1">
-              <a:schemeClr val="accent1"/>
-            </a:lnRef>
-            <a:fillRef idx="3">
-              <a:schemeClr val="accent1"/>
-            </a:fillRef>
-            <a:effectRef idx="2">
-              <a:schemeClr val="accent1"/>
-            </a:effectRef>
-            <a:fontRef idx="minor">
-              <a:schemeClr val="lt1"/>
-            </a:fontRef>
-          </p:style>
-        </p:sp>
-      </p:grpSp>
-      <p:sp>
-        <p:nvSpPr>
-          <p:cNvPr id="2" name="Title 1"/>
-          <p:cNvSpPr>
-            <a:spLocks noGrp="1"/>
-          </p:cNvSpPr>
-          <p:nvPr>
-            <p:ph type="title"/>
-          </p:nvPr>
-        </p:nvSpPr>
+        </p:nvCxnSpPr>
         <p:spPr>
           <a:xfrm>
-            <a:off x="1451206" y="1129513"/>
-            <a:ext cx="5532328" cy="1830584"/>
+            <a:off x="1453896" y="1847088"/>
+            <a:ext cx="9607522" cy="0"/>
+          </a:xfrm>
+          <a:prstGeom prst="line">
+            <a:avLst/>
+          </a:prstGeom>
+          <a:ln w="31750"/>
+        </p:spPr>
+        <p:style>
+          <a:lnRef idx="3">
+            <a:schemeClr val="accent1"/>
+          </a:lnRef>
+          <a:fillRef idx="0">
+            <a:schemeClr val="accent1"/>
+          </a:fillRef>
+          <a:effectRef idx="2">
+            <a:schemeClr val="accent1"/>
+          </a:effectRef>
+          <a:fontRef idx="minor">
+            <a:schemeClr val="tx1"/>
+          </a:fontRef>
+        </p:style>
+      </p:cxnSp>
+    </p:spTree>
+  </p:cSld>
+  <p:clrMapOvr>
+    <a:masterClrMapping/>
+  </p:clrMapOvr>
+</p:sldLayout>
+</file>
+
+<file path=ppt/slideLayouts/slideLayout8.xml><?xml version="1.0" encoding="utf-8"?>
+<p:sldLayout xmlns:a="http://schemas.openxmlformats.org/drawingml/2006/main" xmlns:r="http://schemas.openxmlformats.org/officeDocument/2006/relationships" xmlns:p="http://schemas.openxmlformats.org/presentationml/2006/main" type="vertTitleAndTx" preserve="1">
+  <p:cSld name="Vertikaler Titel und Text">
+    <p:spTree>
+      <p:nvGrpSpPr>
+        <p:cNvPr id="1" name=""/>
+        <p:cNvGrpSpPr/>
+        <p:nvPr/>
+      </p:nvGrpSpPr>
+      <p:grpSpPr>
+        <a:xfrm>
+          <a:off x="0" y="0"/>
+          <a:ext cx="0" cy="0"/>
+          <a:chOff x="0" y="0"/>
+          <a:chExt cx="0" cy="0"/>
+        </a:xfrm>
+      </p:grpSpPr>
+      <p:sp>
+        <p:nvSpPr>
+          <p:cNvPr id="2" name="Vertical Title 1"/>
+          <p:cNvSpPr>
+            <a:spLocks noGrp="1"/>
+          </p:cNvSpPr>
+          <p:nvPr>
+            <p:ph type="title" orient="vert"/>
+          </p:nvPr>
+        </p:nvSpPr>
+        <p:spPr>
+          <a:xfrm>
+            <a:off x="9439111" y="798973"/>
+            <a:ext cx="1615742" cy="4659889"/>
           </a:xfrm>
         </p:spPr>
         <p:txBody>
-          <a:bodyPr anchor="b">
-            <a:normAutofit/>
-          </a:bodyPr>
-          <a:lstStyle>
-            <a:lvl1pPr>
-              <a:defRPr sz="3200"/>
-            </a:lvl1pPr>
-          </a:lstStyle>
-          <a:p>
-            <a:r>
-              <a:rPr lang="de-DE"/>
-              <a:t>Mastertitelformat bearbeiten</a:t>
-            </a:r>
-            <a:endParaRPr lang="en-US" dirty="0"/>
-          </a:p>
-        </p:txBody>
-      </p:sp>
-      <p:sp>
-        <p:nvSpPr>
-          <p:cNvPr id="3" name="Picture Placeholder 2"/>
-          <p:cNvSpPr>
-            <a:spLocks noGrp="1" noChangeAspect="1"/>
-          </p:cNvSpPr>
-          <p:nvPr>
-            <p:ph type="pic" idx="1"/>
-          </p:nvPr>
-        </p:nvSpPr>
-        <p:spPr>
-          <a:xfrm>
-            <a:off x="8124389" y="1122542"/>
-            <a:ext cx="2791171" cy="3866327"/>
-          </a:xfrm>
-          <a:solidFill>
-            <a:schemeClr val="bg1">
-              <a:lumMod val="85000"/>
-            </a:schemeClr>
-          </a:solidFill>
-          <a:ln w="9525" cap="sq">
-            <a:noFill/>
-            <a:miter lim="800000"/>
-          </a:ln>
-          <a:effectLst/>
-        </p:spPr>
-        <p:txBody>
-          <a:bodyPr anchor="t"/>
-          <a:lstStyle>
-            <a:lvl1pPr marL="0" indent="0" algn="ctr">
-              <a:buNone/>
-              <a:defRPr sz="3200"/>
-            </a:lvl1pPr>
-            <a:lvl2pPr marL="457200" indent="0">
-              <a:buNone/>
-              <a:defRPr sz="2800"/>
-            </a:lvl2pPr>
-            <a:lvl3pPr marL="914400" indent="0">
-              <a:buNone/>
-              <a:defRPr sz="2400"/>
-            </a:lvl3pPr>
-            <a:lvl4pPr marL="1371600" indent="0">
-              <a:buNone/>
-              <a:defRPr sz="2000"/>
-            </a:lvl4pPr>
-            <a:lvl5pPr marL="1828800" indent="0">
-              <a:buNone/>
-              <a:defRPr sz="2000"/>
-            </a:lvl5pPr>
-            <a:lvl6pPr marL="2286000" indent="0">
-              <a:buNone/>
-              <a:defRPr sz="2000"/>
-            </a:lvl6pPr>
-            <a:lvl7pPr marL="2743200" indent="0">
-              <a:buNone/>
-              <a:defRPr sz="2000"/>
-            </a:lvl7pPr>
-            <a:lvl8pPr marL="3200400" indent="0">
-              <a:buNone/>
-              <a:defRPr sz="2000"/>
-            </a:lvl8pPr>
-            <a:lvl9pPr marL="3657600" indent="0">
-              <a:buNone/>
-              <a:defRPr sz="2000"/>
-            </a:lvl9pPr>
-          </a:lstStyle>
-          <a:p>
-            <a:r>
-              <a:rPr lang="de-DE"/>
-              <a:t>Bild durch Klicken auf Symbol hinzufügen</a:t>
-            </a:r>
-            <a:endParaRPr lang="en-US" dirty="0"/>
-          </a:p>
-        </p:txBody>
-      </p:sp>
-      <p:sp>
-        <p:nvSpPr>
-          <p:cNvPr id="4" name="Text Placeholder 3"/>
-          <p:cNvSpPr>
-            <a:spLocks noGrp="1"/>
-          </p:cNvSpPr>
-          <p:nvPr>
-            <p:ph type="body" sz="half" idx="2"/>
-          </p:nvPr>
-        </p:nvSpPr>
-        <p:spPr>
-          <a:xfrm>
-            <a:off x="1450329" y="3145992"/>
-            <a:ext cx="5524404" cy="2003742"/>
-          </a:xfrm>
-        </p:spPr>
-        <p:txBody>
-          <a:bodyPr>
-            <a:normAutofit/>
-          </a:bodyPr>
-          <a:lstStyle>
-            <a:lvl1pPr marL="0" indent="0" algn="l">
-              <a:buNone/>
-              <a:defRPr sz="1800"/>
-            </a:lvl1pPr>
-            <a:lvl2pPr marL="457200" indent="0">
-              <a:buNone/>
-              <a:defRPr sz="1400"/>
-            </a:lvl2pPr>
-            <a:lvl3pPr marL="914400" indent="0">
-              <a:buNone/>
-              <a:defRPr sz="1200"/>
-            </a:lvl3pPr>
-            <a:lvl4pPr marL="1371600" indent="0">
-              <a:buNone/>
-              <a:defRPr sz="1000"/>
-            </a:lvl4pPr>
-            <a:lvl5pPr marL="1828800" indent="0">
-              <a:buNone/>
-              <a:defRPr sz="1000"/>
-            </a:lvl5pPr>
-            <a:lvl6pPr marL="2286000" indent="0">
-              <a:buNone/>
-              <a:defRPr sz="1000"/>
-            </a:lvl6pPr>
-            <a:lvl7pPr marL="2743200" indent="0">
-              <a:buNone/>
-              <a:defRPr sz="1000"/>
-            </a:lvl7pPr>
-            <a:lvl8pPr marL="3200400" indent="0">
-              <a:buNone/>
-              <a:defRPr sz="1000"/>
-            </a:lvl8pPr>
-            <a:lvl9pPr marL="3657600" indent="0">
-              <a:buNone/>
-              <a:defRPr sz="1000"/>
-            </a:lvl9pPr>
-          </a:lstStyle>
-          <a:p>
-            <a:pPr lvl="0"/>
-            <a:r>
-              <a:rPr lang="de-DE"/>
-              <a:t>Mastertextformat bearbeiten</a:t>
-            </a:r>
-          </a:p>
-        </p:txBody>
-      </p:sp>
-      <p:sp>
-        <p:nvSpPr>
-          <p:cNvPr id="5" name="Date Placeholder 4"/>
-          <p:cNvSpPr>
-            <a:spLocks noGrp="1"/>
-          </p:cNvSpPr>
-          <p:nvPr>
-            <p:ph type="dt" sz="half" idx="10"/>
-          </p:nvPr>
-        </p:nvSpPr>
-        <p:spPr>
-          <a:xfrm>
-            <a:off x="1447382" y="5469856"/>
-            <a:ext cx="5527351" cy="320123"/>
-          </a:xfrm>
-        </p:spPr>
-        <p:txBody>
-          <a:bodyPr/>
+          <a:bodyPr vert="eaVert"/>
           <a:lstStyle>
             <a:lvl1pPr algn="l">
               <a:defRPr/>
             </a:lvl1pPr>
           </a:lstStyle>
           <a:p>
+            <a:r>
+              <a:rPr lang="de-DE"/>
+              <a:t>Mastertitelformat bearbeiten</a:t>
+            </a:r>
+            <a:endParaRPr lang="en-US" dirty="0"/>
+          </a:p>
+        </p:txBody>
+      </p:sp>
+      <p:sp>
+        <p:nvSpPr>
+          <p:cNvPr id="3" name="Vertical Text Placeholder 2"/>
+          <p:cNvSpPr>
+            <a:spLocks noGrp="1"/>
+          </p:cNvSpPr>
+          <p:nvPr>
+            <p:ph type="body" orient="vert" idx="1"/>
+          </p:nvPr>
+        </p:nvSpPr>
+        <p:spPr>
+          <a:xfrm>
+            <a:off x="1444672" y="798973"/>
+            <a:ext cx="7828830" cy="4659889"/>
+          </a:xfrm>
+        </p:spPr>
+        <p:txBody>
+          <a:bodyPr vert="eaVert"/>
+          <a:lstStyle/>
+          <a:p>
+            <a:pPr lvl="0"/>
+            <a:r>
+              <a:rPr lang="de-DE"/>
+              <a:t>Mastertextformat bearbeiten</a:t>
+            </a:r>
+          </a:p>
+          <a:p>
+            <a:pPr lvl="1"/>
+            <a:r>
+              <a:rPr lang="de-DE"/>
+              <a:t>Zweite Ebene</a:t>
+            </a:r>
+          </a:p>
+          <a:p>
+            <a:pPr lvl="2"/>
+            <a:r>
+              <a:rPr lang="de-DE"/>
+              <a:t>Dritte Ebene</a:t>
+            </a:r>
+          </a:p>
+          <a:p>
+            <a:pPr lvl="3"/>
+            <a:r>
+              <a:rPr lang="de-DE"/>
+              <a:t>Vierte Ebene</a:t>
+            </a:r>
+          </a:p>
+          <a:p>
+            <a:pPr lvl="4"/>
+            <a:r>
+              <a:rPr lang="de-DE"/>
+              <a:t>Fünfte Ebene</a:t>
+            </a:r>
+            <a:endParaRPr lang="en-US" dirty="0"/>
+          </a:p>
+        </p:txBody>
+      </p:sp>
+      <p:sp>
+        <p:nvSpPr>
+          <p:cNvPr id="4" name="Date Placeholder 3"/>
+          <p:cNvSpPr>
+            <a:spLocks noGrp="1"/>
+          </p:cNvSpPr>
+          <p:nvPr>
+            <p:ph type="dt" sz="half" idx="10"/>
+          </p:nvPr>
+        </p:nvSpPr>
+        <p:spPr/>
+        <p:txBody>
+          <a:bodyPr/>
+          <a:lstStyle/>
+          <a:p>
             <a:fld id="{48A87A34-81AB-432B-8DAE-1953F412C126}" type="datetimeFigureOut">
               <a:rPr lang="en-US" dirty="0"/>
-              <a:pPr/>
-              <a:t>3/7/2023</a:t>
+              <a:t>9/30/2025</a:t>
             </a:fld>
             <a:endParaRPr lang="en-US" dirty="0"/>
           </a:p>
@@ -2763,7 +1653,7 @@
       </p:sp>
       <p:sp>
         <p:nvSpPr>
-          <p:cNvPr id="6" name="Footer Placeholder 5"/>
+          <p:cNvPr id="5" name="Footer Placeholder 4"/>
           <p:cNvSpPr>
             <a:spLocks noGrp="1"/>
           </p:cNvSpPr>
@@ -2771,23 +1661,18 @@
             <p:ph type="ftr" sz="quarter" idx="11"/>
           </p:nvPr>
         </p:nvSpPr>
-        <p:spPr>
-          <a:xfrm>
-            <a:off x="1447382" y="318640"/>
-            <a:ext cx="5541004" cy="320931"/>
-          </a:xfrm>
-        </p:spPr>
-        <p:txBody>
-          <a:bodyPr/>
-          <a:lstStyle/>
-          <a:p>
-            <a:endParaRPr lang="en-US" dirty="0"/>
-          </a:p>
-        </p:txBody>
-      </p:sp>
-      <p:sp>
-        <p:nvSpPr>
-          <p:cNvPr id="7" name="Slide Number Placeholder 6"/>
+        <p:spPr/>
+        <p:txBody>
+          <a:bodyPr/>
+          <a:lstStyle/>
+          <a:p>
+            <a:endParaRPr lang="en-US" dirty="0"/>
+          </a:p>
+        </p:txBody>
+      </p:sp>
+      <p:sp>
+        <p:nvSpPr>
+          <p:cNvPr id="6" name="Slide Number Placeholder 5"/>
           <p:cNvSpPr>
             <a:spLocks noGrp="1"/>
           </p:cNvSpPr>
@@ -2802,7 +1687,7 @@
           <a:p>
             <a:fld id="{6D22F896-40B5-4ADD-8801-0D06FADFA095}" type="slidenum">
               <a:rPr lang="en-US" dirty="0"/>
-              <a:t>‹Nr.›</a:t>
+              <a:t>‹#›</a:t>
             </a:fld>
             <a:endParaRPr lang="en-US" dirty="0"/>
           </a:p>
@@ -2810,14 +1695,14 @@
       </p:sp>
       <p:cxnSp>
         <p:nvCxnSpPr>
-          <p:cNvPr id="31" name="Straight Connector 30"/>
+          <p:cNvPr id="15" name="Straight Connector 14"/>
           <p:cNvCxnSpPr/>
           <p:nvPr/>
         </p:nvCxnSpPr>
         <p:spPr>
           <a:xfrm>
-            <a:off x="1447382" y="3143605"/>
-            <a:ext cx="5527351" cy="0"/>
+            <a:off x="9439111" y="798973"/>
+            <a:ext cx="0" cy="4659889"/>
           </a:xfrm>
           <a:prstGeom prst="line">
             <a:avLst/>
@@ -2917,6 +1802,13 @@
             <a:schemeClr val="lt1"/>
           </a:fontRef>
         </p:style>
+        <p:txBody>
+          <a:bodyPr/>
+          <a:lstStyle/>
+          <a:p>
+            <a:endParaRPr lang="zh-CN" altLang="en-US"/>
+          </a:p>
+        </p:txBody>
       </p:sp>
       <p:pic>
         <p:nvPicPr>
@@ -2927,7 +1819,7 @@
           <p:nvPr/>
         </p:nvPicPr>
         <p:blipFill rotWithShape="1">
-          <a:blip r:embed="rId13">
+          <a:blip r:embed="rId10">
             <a:extLst>
               <a:ext uri="{28A0092B-C50C-407E-A947-70E740481C1C}">
                 <a14:useLocalDpi xmlns:a14="http://schemas.microsoft.com/office/drawing/2010/main" val="0"/>
@@ -3078,7 +1970,7 @@
             <a:fld id="{48A87A34-81AB-432B-8DAE-1953F412C126}" type="datetimeFigureOut">
               <a:rPr lang="en-US" dirty="0"/>
               <a:pPr/>
-              <a:t>3/7/2023</a:t>
+              <a:t>9/30/2025</a:t>
             </a:fld>
             <a:endParaRPr lang="en-US" dirty="0"/>
           </a:p>
@@ -3155,7 +2047,7 @@
             <a:fld id="{6D22F896-40B5-4ADD-8801-0D06FADFA095}" type="slidenum">
               <a:rPr lang="en-US" dirty="0"/>
               <a:pPr/>
-              <a:t>‹Nr.›</a:t>
+              <a:t>‹#›</a:t>
             </a:fld>
             <a:endParaRPr lang="en-US" dirty="0"/>
           </a:p>
@@ -3205,14 +2097,11 @@
     <p:sldLayoutId id="2147483649" r:id="rId1"/>
     <p:sldLayoutId id="2147483650" r:id="rId2"/>
     <p:sldLayoutId id="2147483651" r:id="rId3"/>
-    <p:sldLayoutId id="2147483652" r:id="rId4"/>
-    <p:sldLayoutId id="2147483653" r:id="rId5"/>
-    <p:sldLayoutId id="2147483654" r:id="rId6"/>
-    <p:sldLayoutId id="2147483655" r:id="rId7"/>
-    <p:sldLayoutId id="2147483656" r:id="rId8"/>
-    <p:sldLayoutId id="2147483657" r:id="rId9"/>
-    <p:sldLayoutId id="2147483658" r:id="rId10"/>
-    <p:sldLayoutId id="2147483659" r:id="rId11"/>
+    <p:sldLayoutId id="2147483654" r:id="rId4"/>
+    <p:sldLayoutId id="2147483655" r:id="rId5"/>
+    <p:sldLayoutId id="2147483656" r:id="rId6"/>
+    <p:sldLayoutId id="2147483658" r:id="rId7"/>
+    <p:sldLayoutId id="2147483659" r:id="rId8"/>
   </p:sldLayoutIdLst>
   <p:txStyles>
     <p:titleStyle>

</xml_diff>